<commit_message>
Update session 2 and 3
</commit_message>
<xml_diff>
--- a/Session-03-ITS2_Symbiodiniaceae_workflow_in_R_and_RStudio/Session-03-01-Symportal-what-gives.pptx
+++ b/Session-03-ITS2_Symbiodiniaceae_workflow_in_R_and_RStudio/Session-03-01-Symportal-what-gives.pptx
@@ -131,7 +131,7 @@
 <file path=ppt/revisionInfo.xml><?xml version="1.0" encoding="utf-8"?>
 <p1510:revInfo xmlns:a="http://schemas.openxmlformats.org/drawingml/2006/main" xmlns:r="http://schemas.openxmlformats.org/officeDocument/2006/relationships" xmlns:p1510="http://schemas.microsoft.com/office/powerpoint/2015/10/main">
   <p1510:revLst>
-    <p1510:client id="{24C0A168-9B24-4BF9-906F-2840F6EDE3EA}" v="1515" dt="2023-11-08T12:42:44.612"/>
+    <p1510:client id="{24C0A168-9B24-4BF9-906F-2840F6EDE3EA}" v="1516" dt="2023-11-10T11:02:50.681"/>
   </p1510:revLst>
 </p1510:revInfo>
 </file>
@@ -141,7 +141,7 @@
   <pc:docChgLst>
     <pc:chgData name="John Bennedick Quijano" userId="edb3d445-3dba-4f62-8077-bafdc7822d72" providerId="ADAL" clId="{24C0A168-9B24-4BF9-906F-2840F6EDE3EA}"/>
     <pc:docChg chg="undo custSel addSld delSld modSld">
-      <pc:chgData name="John Bennedick Quijano" userId="edb3d445-3dba-4f62-8077-bafdc7822d72" providerId="ADAL" clId="{24C0A168-9B24-4BF9-906F-2840F6EDE3EA}" dt="2023-11-08T12:42:44.612" v="3430"/>
+      <pc:chgData name="John Bennedick Quijano" userId="edb3d445-3dba-4f62-8077-bafdc7822d72" providerId="ADAL" clId="{24C0A168-9B24-4BF9-906F-2840F6EDE3EA}" dt="2023-11-10T11:03:06.262" v="3432" actId="1582"/>
       <pc:docMkLst>
         <pc:docMk/>
       </pc:docMkLst>
@@ -1275,7 +1275,7 @@
         </pc:picChg>
       </pc:sldChg>
       <pc:sldChg chg="addSp modSp add mod modAnim modNotesTx">
-        <pc:chgData name="John Bennedick Quijano" userId="edb3d445-3dba-4f62-8077-bafdc7822d72" providerId="ADAL" clId="{24C0A168-9B24-4BF9-906F-2840F6EDE3EA}" dt="2023-11-08T12:42:30.487" v="3418"/>
+        <pc:chgData name="John Bennedick Quijano" userId="edb3d445-3dba-4f62-8077-bafdc7822d72" providerId="ADAL" clId="{24C0A168-9B24-4BF9-906F-2840F6EDE3EA}" dt="2023-11-10T11:03:06.262" v="3432" actId="1582"/>
         <pc:sldMkLst>
           <pc:docMk/>
           <pc:sldMk cId="438722083" sldId="263"/>
@@ -1342,6 +1342,78 @@
             <pc:docMk/>
             <pc:sldMk cId="438722083" sldId="263"/>
             <ac:spMk id="12" creationId="{144C7760-F403-7714-12CF-1951884D6C80}"/>
+          </ac:spMkLst>
+        </pc:spChg>
+        <pc:spChg chg="mod">
+          <ac:chgData name="John Bennedick Quijano" userId="edb3d445-3dba-4f62-8077-bafdc7822d72" providerId="ADAL" clId="{24C0A168-9B24-4BF9-906F-2840F6EDE3EA}" dt="2023-11-10T11:02:50.681" v="3431" actId="11530"/>
+          <ac:spMkLst>
+            <pc:docMk/>
+            <pc:sldMk cId="438722083" sldId="263"/>
+            <ac:spMk id="21" creationId="{888C7394-F2E6-6051-D72A-0F8818BC465D}"/>
+          </ac:spMkLst>
+        </pc:spChg>
+        <pc:spChg chg="mod">
+          <ac:chgData name="John Bennedick Quijano" userId="edb3d445-3dba-4f62-8077-bafdc7822d72" providerId="ADAL" clId="{24C0A168-9B24-4BF9-906F-2840F6EDE3EA}" dt="2023-11-10T11:03:06.262" v="3432" actId="1582"/>
+          <ac:spMkLst>
+            <pc:docMk/>
+            <pc:sldMk cId="438722083" sldId="263"/>
+            <ac:spMk id="22" creationId="{55647BD7-AA2E-61C9-9FC0-170CEE13A115}"/>
+          </ac:spMkLst>
+        </pc:spChg>
+        <pc:spChg chg="mod">
+          <ac:chgData name="John Bennedick Quijano" userId="edb3d445-3dba-4f62-8077-bafdc7822d72" providerId="ADAL" clId="{24C0A168-9B24-4BF9-906F-2840F6EDE3EA}" dt="2023-11-10T11:03:06.262" v="3432" actId="1582"/>
+          <ac:spMkLst>
+            <pc:docMk/>
+            <pc:sldMk cId="438722083" sldId="263"/>
+            <ac:spMk id="23" creationId="{CAE08687-F82A-0D7B-29CD-1FB19D66EB1D}"/>
+          </ac:spMkLst>
+        </pc:spChg>
+        <pc:spChg chg="mod">
+          <ac:chgData name="John Bennedick Quijano" userId="edb3d445-3dba-4f62-8077-bafdc7822d72" providerId="ADAL" clId="{24C0A168-9B24-4BF9-906F-2840F6EDE3EA}" dt="2023-11-10T11:03:06.262" v="3432" actId="1582"/>
+          <ac:spMkLst>
+            <pc:docMk/>
+            <pc:sldMk cId="438722083" sldId="263"/>
+            <ac:spMk id="24" creationId="{BBCBF8CA-E3B0-6228-137B-415C1061EA86}"/>
+          </ac:spMkLst>
+        </pc:spChg>
+        <pc:spChg chg="mod">
+          <ac:chgData name="John Bennedick Quijano" userId="edb3d445-3dba-4f62-8077-bafdc7822d72" providerId="ADAL" clId="{24C0A168-9B24-4BF9-906F-2840F6EDE3EA}" dt="2023-11-10T11:03:06.262" v="3432" actId="1582"/>
+          <ac:spMkLst>
+            <pc:docMk/>
+            <pc:sldMk cId="438722083" sldId="263"/>
+            <ac:spMk id="25" creationId="{A9C18E6C-F5A4-E17C-0C51-FE1745F9C33A}"/>
+          </ac:spMkLst>
+        </pc:spChg>
+        <pc:spChg chg="mod">
+          <ac:chgData name="John Bennedick Quijano" userId="edb3d445-3dba-4f62-8077-bafdc7822d72" providerId="ADAL" clId="{24C0A168-9B24-4BF9-906F-2840F6EDE3EA}" dt="2023-11-10T11:03:06.262" v="3432" actId="1582"/>
+          <ac:spMkLst>
+            <pc:docMk/>
+            <pc:sldMk cId="438722083" sldId="263"/>
+            <ac:spMk id="26" creationId="{CC6B5FB5-6B7F-F330-AD0F-F3143E22F703}"/>
+          </ac:spMkLst>
+        </pc:spChg>
+        <pc:spChg chg="mod">
+          <ac:chgData name="John Bennedick Quijano" userId="edb3d445-3dba-4f62-8077-bafdc7822d72" providerId="ADAL" clId="{24C0A168-9B24-4BF9-906F-2840F6EDE3EA}" dt="2023-11-10T11:03:06.262" v="3432" actId="1582"/>
+          <ac:spMkLst>
+            <pc:docMk/>
+            <pc:sldMk cId="438722083" sldId="263"/>
+            <ac:spMk id="29" creationId="{7B939874-CC04-E18E-A1FC-580F66245799}"/>
+          </ac:spMkLst>
+        </pc:spChg>
+        <pc:spChg chg="mod">
+          <ac:chgData name="John Bennedick Quijano" userId="edb3d445-3dba-4f62-8077-bafdc7822d72" providerId="ADAL" clId="{24C0A168-9B24-4BF9-906F-2840F6EDE3EA}" dt="2023-11-10T11:03:06.262" v="3432" actId="1582"/>
+          <ac:spMkLst>
+            <pc:docMk/>
+            <pc:sldMk cId="438722083" sldId="263"/>
+            <ac:spMk id="30" creationId="{0472CA71-DB60-587B-57F3-D1F7817A3DAF}"/>
+          </ac:spMkLst>
+        </pc:spChg>
+        <pc:spChg chg="mod">
+          <ac:chgData name="John Bennedick Quijano" userId="edb3d445-3dba-4f62-8077-bafdc7822d72" providerId="ADAL" clId="{24C0A168-9B24-4BF9-906F-2840F6EDE3EA}" dt="2023-11-10T11:03:06.262" v="3432" actId="1582"/>
+          <ac:spMkLst>
+            <pc:docMk/>
+            <pc:sldMk cId="438722083" sldId="263"/>
+            <ac:spMk id="31" creationId="{2D6EE07E-F283-A573-C9E0-C9BBEB13CC6D}"/>
           </ac:spMkLst>
         </pc:spChg>
         <pc:picChg chg="add mod">
@@ -2120,7 +2192,7 @@
           <a:p>
             <a:fld id="{537B3D75-81AE-4904-B526-95435BD25C47}" type="datetimeFigureOut">
               <a:rPr lang="en-PH" smtClean="0"/>
-              <a:t>08/11/2023</a:t>
+              <a:t>10/11/2023</a:t>
             </a:fld>
             <a:endParaRPr lang="en-PH"/>
           </a:p>
@@ -2624,7 +2696,7 @@
           <a:p>
             <a:fld id="{B092F450-E4B4-4B86-8284-F5C1CEB4532F}" type="datetimeFigureOut">
               <a:rPr lang="en-PH" smtClean="0"/>
-              <a:t>08/11/2023</a:t>
+              <a:t>10/11/2023</a:t>
             </a:fld>
             <a:endParaRPr lang="en-PH"/>
           </a:p>
@@ -2824,7 +2896,7 @@
           <a:p>
             <a:fld id="{B092F450-E4B4-4B86-8284-F5C1CEB4532F}" type="datetimeFigureOut">
               <a:rPr lang="en-PH" smtClean="0"/>
-              <a:t>08/11/2023</a:t>
+              <a:t>10/11/2023</a:t>
             </a:fld>
             <a:endParaRPr lang="en-PH"/>
           </a:p>
@@ -3034,7 +3106,7 @@
           <a:p>
             <a:fld id="{B092F450-E4B4-4B86-8284-F5C1CEB4532F}" type="datetimeFigureOut">
               <a:rPr lang="en-PH" smtClean="0"/>
-              <a:t>08/11/2023</a:t>
+              <a:t>10/11/2023</a:t>
             </a:fld>
             <a:endParaRPr lang="en-PH"/>
           </a:p>
@@ -3234,7 +3306,7 @@
           <a:p>
             <a:fld id="{B092F450-E4B4-4B86-8284-F5C1CEB4532F}" type="datetimeFigureOut">
               <a:rPr lang="en-PH" smtClean="0"/>
-              <a:t>08/11/2023</a:t>
+              <a:t>10/11/2023</a:t>
             </a:fld>
             <a:endParaRPr lang="en-PH"/>
           </a:p>
@@ -3510,7 +3582,7 @@
           <a:p>
             <a:fld id="{B092F450-E4B4-4B86-8284-F5C1CEB4532F}" type="datetimeFigureOut">
               <a:rPr lang="en-PH" smtClean="0"/>
-              <a:t>08/11/2023</a:t>
+              <a:t>10/11/2023</a:t>
             </a:fld>
             <a:endParaRPr lang="en-PH"/>
           </a:p>
@@ -3778,7 +3850,7 @@
           <a:p>
             <a:fld id="{B092F450-E4B4-4B86-8284-F5C1CEB4532F}" type="datetimeFigureOut">
               <a:rPr lang="en-PH" smtClean="0"/>
-              <a:t>08/11/2023</a:t>
+              <a:t>10/11/2023</a:t>
             </a:fld>
             <a:endParaRPr lang="en-PH"/>
           </a:p>
@@ -4193,7 +4265,7 @@
           <a:p>
             <a:fld id="{B092F450-E4B4-4B86-8284-F5C1CEB4532F}" type="datetimeFigureOut">
               <a:rPr lang="en-PH" smtClean="0"/>
-              <a:t>08/11/2023</a:t>
+              <a:t>10/11/2023</a:t>
             </a:fld>
             <a:endParaRPr lang="en-PH"/>
           </a:p>
@@ -4335,7 +4407,7 @@
           <a:p>
             <a:fld id="{B092F450-E4B4-4B86-8284-F5C1CEB4532F}" type="datetimeFigureOut">
               <a:rPr lang="en-PH" smtClean="0"/>
-              <a:t>08/11/2023</a:t>
+              <a:t>10/11/2023</a:t>
             </a:fld>
             <a:endParaRPr lang="en-PH"/>
           </a:p>
@@ -4448,7 +4520,7 @@
           <a:p>
             <a:fld id="{B092F450-E4B4-4B86-8284-F5C1CEB4532F}" type="datetimeFigureOut">
               <a:rPr lang="en-PH" smtClean="0"/>
-              <a:t>08/11/2023</a:t>
+              <a:t>10/11/2023</a:t>
             </a:fld>
             <a:endParaRPr lang="en-PH"/>
           </a:p>
@@ -4761,7 +4833,7 @@
           <a:p>
             <a:fld id="{B092F450-E4B4-4B86-8284-F5C1CEB4532F}" type="datetimeFigureOut">
               <a:rPr lang="en-PH" smtClean="0"/>
-              <a:t>08/11/2023</a:t>
+              <a:t>10/11/2023</a:t>
             </a:fld>
             <a:endParaRPr lang="en-PH"/>
           </a:p>
@@ -5050,7 +5122,7 @@
           <a:p>
             <a:fld id="{B092F450-E4B4-4B86-8284-F5C1CEB4532F}" type="datetimeFigureOut">
               <a:rPr lang="en-PH" smtClean="0"/>
-              <a:t>08/11/2023</a:t>
+              <a:t>10/11/2023</a:t>
             </a:fld>
             <a:endParaRPr lang="en-PH"/>
           </a:p>
@@ -5293,7 +5365,7 @@
           <a:p>
             <a:fld id="{B092F450-E4B4-4B86-8284-F5C1CEB4532F}" type="datetimeFigureOut">
               <a:rPr lang="en-PH" smtClean="0"/>
-              <a:t>08/11/2023</a:t>
+              <a:t>10/11/2023</a:t>
             </a:fld>
             <a:endParaRPr lang="en-PH"/>
           </a:p>
@@ -9108,7 +9180,7 @@
         </p:grpSpPr>
         <p:sp>
           <p:nvSpPr>
-            <p:cNvPr id="21" name="Oval 20">
+            <p:cNvPr id="21" name="Rectangle: Rounded Corners 20">
               <a:extLst>
                 <a:ext uri="{FF2B5EF4-FFF2-40B4-BE49-F238E27FC236}">
                   <a16:creationId xmlns:a16="http://schemas.microsoft.com/office/drawing/2014/main" id="{888C7394-F2E6-6051-D72A-0F8818BC465D}"/>
@@ -9123,7 +9195,7 @@
               <a:off x="838200" y="2886075"/>
               <a:ext cx="3051810" cy="857250"/>
             </a:xfrm>
-            <a:prstGeom prst="ellipse">
+            <a:prstGeom prst="roundRect">
               <a:avLst/>
             </a:prstGeom>
             <a:solidFill>
@@ -9181,7 +9253,7 @@
             <a:solidFill>
               <a:srgbClr val="28467C"/>
             </a:solidFill>
-            <a:ln>
+            <a:ln w="3175">
               <a:solidFill>
                 <a:schemeClr val="bg1"/>
               </a:solidFill>
@@ -9235,7 +9307,7 @@
             <a:solidFill>
               <a:srgbClr val="28467C"/>
             </a:solidFill>
-            <a:ln>
+            <a:ln w="3175">
               <a:solidFill>
                 <a:schemeClr val="bg1"/>
               </a:solidFill>
@@ -9289,7 +9361,7 @@
             <a:solidFill>
               <a:srgbClr val="28467C"/>
             </a:solidFill>
-            <a:ln>
+            <a:ln w="3175">
               <a:solidFill>
                 <a:schemeClr val="bg1"/>
               </a:solidFill>
@@ -9343,7 +9415,7 @@
             <a:solidFill>
               <a:srgbClr val="28467C"/>
             </a:solidFill>
-            <a:ln>
+            <a:ln w="3175">
               <a:solidFill>
                 <a:schemeClr val="bg1"/>
               </a:solidFill>
@@ -9397,7 +9469,7 @@
             <a:solidFill>
               <a:srgbClr val="28467C"/>
             </a:solidFill>
-            <a:ln>
+            <a:ln w="3175">
               <a:solidFill>
                 <a:schemeClr val="bg1"/>
               </a:solidFill>
@@ -9451,7 +9523,7 @@
             <a:solidFill>
               <a:srgbClr val="28467C"/>
             </a:solidFill>
-            <a:ln>
+            <a:ln w="3175">
               <a:solidFill>
                 <a:schemeClr val="bg1"/>
               </a:solidFill>
@@ -9505,7 +9577,7 @@
             <a:solidFill>
               <a:srgbClr val="28467C"/>
             </a:solidFill>
-            <a:ln>
+            <a:ln w="3175">
               <a:solidFill>
                 <a:schemeClr val="bg1"/>
               </a:solidFill>
@@ -9559,7 +9631,7 @@
             <a:solidFill>
               <a:srgbClr val="28467C"/>
             </a:solidFill>
-            <a:ln>
+            <a:ln w="3175">
               <a:solidFill>
                 <a:schemeClr val="bg1"/>
               </a:solidFill>

</xml_diff>